<commit_message>
Update Jumanji Quiz Presentation.pptx
added github repository link and code pictures
</commit_message>
<xml_diff>
--- a/Jumanji Quiz Presentation.pptx
+++ b/Jumanji Quiz Presentation.pptx
@@ -4273,13 +4273,13 @@
         </p:nvSpPr>
         <p:spPr>
           <a:xfrm>
-            <a:off x="1857556" y="5272809"/>
-            <a:ext cx="8442384" cy="725018"/>
+            <a:off x="1857556" y="5272808"/>
+            <a:ext cx="8442384" cy="1073961"/>
           </a:xfrm>
         </p:spPr>
         <p:txBody>
           <a:bodyPr>
-            <a:normAutofit fontScale="85000" lnSpcReduction="10000"/>
+            <a:noAutofit/>
           </a:bodyPr>
           <a:lstStyle/>
           <a:p>
@@ -4289,7 +4289,7 @@
               </a:lnSpc>
             </a:pPr>
             <a:r>
-              <a:rPr lang="en-US" sz="1700" dirty="0">
+              <a:rPr lang="en-US" sz="1400" dirty="0">
                 <a:solidFill>
                   <a:srgbClr val="FFFFFF"/>
                 </a:solidFill>
@@ -4297,7 +4297,7 @@
               <a:t>A simple quiz to test whether users can survive Jumanji; based off of the film, </a:t>
             </a:r>
             <a:r>
-              <a:rPr lang="en-US" sz="1700" i="1" dirty="0">
+              <a:rPr lang="en-US" sz="1400" i="1" dirty="0">
                 <a:solidFill>
                   <a:srgbClr val="FFFFFF"/>
                 </a:solidFill>
@@ -4305,7 +4305,7 @@
               <a:t>Jumanji: Welcome to the Jungle</a:t>
             </a:r>
             <a:r>
-              <a:rPr lang="en-US" sz="1700" dirty="0">
+              <a:rPr lang="en-US" sz="1400" dirty="0">
                 <a:solidFill>
                   <a:srgbClr val="FFFFFF"/>
                 </a:solidFill>
@@ -4320,12 +4320,35 @@
               </a:lnSpc>
             </a:pPr>
             <a:r>
-              <a:rPr lang="en-US" sz="1700" dirty="0">
+              <a:rPr lang="en-US" sz="1400" dirty="0">
                 <a:solidFill>
                   <a:srgbClr val="FFFFFF"/>
                 </a:solidFill>
               </a:rPr>
               <a:t>By: Janai Hemphill</a:t>
+            </a:r>
+          </a:p>
+          <a:p>
+            <a:pPr>
+              <a:lnSpc>
+                <a:spcPct val="90000"/>
+              </a:lnSpc>
+            </a:pPr>
+            <a:r>
+              <a:rPr lang="en-US" sz="1400" dirty="0" err="1">
+                <a:solidFill>
+                  <a:srgbClr val="FFFFFF"/>
+                </a:solidFill>
+              </a:rPr>
+              <a:t>Github</a:t>
+            </a:r>
+            <a:r>
+              <a:rPr lang="en-US" sz="1400" dirty="0">
+                <a:solidFill>
+                  <a:srgbClr val="FFFFFF"/>
+                </a:solidFill>
+              </a:rPr>
+              <a:t> Repository: https://github.com/ksu-is/Can-You-Survive-Jumanji-Quiz</a:t>
             </a:r>
           </a:p>
         </p:txBody>
@@ -4534,6 +4557,41 @@
           </p:style>
         </p:cxnSp>
       </p:grpSp>
+      <p:pic>
+        <p:nvPicPr>
+          <p:cNvPr id="6" name="Picture 5" descr="A screenshot of a computer&#10;&#10;Description automatically generated with medium confidence">
+            <a:extLst>
+              <a:ext uri="{FF2B5EF4-FFF2-40B4-BE49-F238E27FC236}">
+                <a16:creationId xmlns:a16="http://schemas.microsoft.com/office/drawing/2014/main" id="{14DB2F12-3DB3-464E-BD41-C5F4AAEA2E58}"/>
+              </a:ext>
+            </a:extLst>
+          </p:cNvPr>
+          <p:cNvPicPr>
+            <a:picLocks noChangeAspect="1"/>
+          </p:cNvPicPr>
+          <p:nvPr/>
+        </p:nvPicPr>
+        <p:blipFill rotWithShape="1">
+          <a:blip r:embed="rId3">
+            <a:extLst>
+              <a:ext uri="{28A0092B-C50C-407E-A947-70E740481C1C}">
+                <a14:useLocalDpi xmlns:a14="http://schemas.microsoft.com/office/drawing/2010/main" val="0"/>
+              </a:ext>
+            </a:extLst>
+          </a:blip>
+          <a:srcRect l="3516" t="4583" r="48377" b="20000"/>
+          <a:stretch/>
+        </p:blipFill>
+        <p:spPr>
+          <a:xfrm>
+            <a:off x="10115909" y="4492100"/>
+            <a:ext cx="2076071" cy="2296635"/>
+          </a:xfrm>
+          <a:prstGeom prst="rect">
+            <a:avLst/>
+          </a:prstGeom>
+        </p:spPr>
+      </p:pic>
     </p:spTree>
     <p:extLst>
       <p:ext uri="{BB962C8B-B14F-4D97-AF65-F5344CB8AC3E}">

</xml_diff>